<commit_message>
0705 - BaekJoon 2310 [그래프] 어드벤처 게임 ppt
</commit_message>
<xml_diff>
--- a/Senior/백준 2310.pptx
+++ b/Senior/백준 2310.pptx
@@ -133,33 +133,6 @@
           <inkml:channelProperty channel="F" name="resolution" value="0" units="1/dev"/>
         </inkml:channelProperties>
       </inkml:inkSource>
-      <inkml:timestamp xml:id="ts0" timeString="2023-07-05T09:12:34.189"/>
-    </inkml:context>
-    <inkml:brush xml:id="br0">
-      <inkml:brushProperty name="width" value="0.05" units="cm"/>
-      <inkml:brushProperty name="height" value="0.05" units="cm"/>
-    </inkml:brush>
-  </inkml:definitions>
-  <inkml:trace contextRef="#ctx0" brushRef="#br0">1 10485 24575,'0'-1'0,"0"0"0,1 0 0,-1-1 0,1 1 0,-1 0 0,1 0 0,-1 0 0,1 0 0,-1 0 0,1 0 0,0 0 0,0 0 0,0 0 0,0 0 0,-1 0 0,1 0 0,0 1 0,2-2 0,23-13 0,-21 13 0,9-7 0,0-1 0,0-1 0,-1 0 0,0-1 0,-1 0 0,14-18 0,17-17 0,-17 21 0,-2-2 0,24-37 0,46-53 0,-67 87 0,-11 12 0,19-18 0,-16 19 0,-2 0 0,31-40 0,32-49 0,-75 100 0,0 1 0,0 0 0,0 1 0,0-1 0,12-8 0,-7 5 0,0 0 0,-1-1 0,0 0 0,-1-1 0,10-13 0,11-15 0,-16 23 0,7-6 0,-2 0 0,0-2 0,27-50 0,-40 66 0,0 0 0,1 0 0,0 1 0,9-10 0,7-9 0,10-12 0,2 1 0,47-40 0,-64 62 0,1 0 0,28-18 0,-29 22 0,-1-1 0,28-26 0,84-76 0,-116 103 0,87-70 0,-76 63 0,36-22 0,-39 26 0,22-16 0,39-38 0,-72 60 0,21-16 0,22-23 0,16-10 0,-17 17 0,-37 26 0,21-14 0,-6 4 0,-7 7 0,31-19 0,-22 16 0,-13 10 0,-1 1 0,2 1 0,-1 1 0,1 1 0,28-6 0,-11 2 0,-16 6 0,1 1 0,-1 1 0,1 1 0,0 1 0,23 2 0,10-1 0,-34 0 0,0 1 0,29 7 0,-29-5 0,1-1 0,27 2 0,41 6 0,435-12 0,-503-1 0,1 0 0,-1-2 0,0 0 0,36-14 0,1 1 0,-44 13 0,-1-1 0,1 0 0,-1-1 0,18-12 0,-12 5 0,30-28 0,-19 15 0,-15 14 0,13-11 0,26-29 0,-31 35 0,-20 15 0,0 0 0,0-1 0,0 1 0,0-1 0,0 1 0,0-1 0,3-5 0,2-3 0,0 1 0,14-14 0,13-16 0,-29 32 0,0 1 0,1 0 0,10-8 0,13-15 0,11-18 0,-21 26 0,-2 0 0,27-42 0,30-79 0,1-4 0,-46 96 0,47-88 0,-56 97 0,10-26 0,-29 61 0,3-7 0,0 0 0,-1 0 0,2-16 0,-2 10 0,8-26 0,-7 31 0,-1 0 0,-1-1 0,3-23 0,-1-25 0,1-22 0,2-94 0,-6 160 0,0-7 0,1-1 0,2 1 0,10-34 0,-11 46 0,-1-1 0,0 0 0,0-27 0,1-2 0,5-80 0,8-40 0,-12 121 0,-2 23 0,0-25 0,-3-12 0,8-58 0,-4 61 0,-4-77 0,-2 52 0,2-271 0,6 297 0,-3 38 0,0-25 0,-2 18 0,1 0 0,8-39 0,-6 44 0,10-90 0,-4-26 0,0 45 0,-6 59 0,-1-1 0,-2 1 0,-3-38 0,0 5 0,2-472 0,6 472 0,-3 43 0,0-25 0,-3-507 0,11 464 0,-6 13 0,1-7 0,-7 37 0,2-66 0,4 74 0,1-15 0,5-62 0,-10 79 0,6-50 0,-2 37 0,3-16 0,-1 30 0,-1 12 0,-2-1 0,-1 1 0,1-32 0,-4 34 0,-1-7 0,1 1 0,7-46 0,-1 34 0,-5 26 0,1-1 0,0 1 0,7-20 0,-6 22 0,-1 1 0,0-1 0,-1 1 0,0-1 0,0-16 0,3-27 0,-2 37 0,-1 0 0,0-17 0,-1 18 0,1 1 0,0-1 0,4-14 0,14-78 0,-16 93 0,-1 0 0,0 0 0,-1-22 0,0 20 0,0-1 0,3-17 0,5-33 0,-4 23 0,6-48 0,-10 84 0,23-159 0,-19 132 0,-3 22 0,2-28 0,-3 16 0,1 1 0,2-1 0,1 1 0,11-35 0,-15 55 0,13-70 0,-6 30 0,-5 28 0,0 0 0,0 1 0,1-1 0,0 1 0,2 0 0,11-24 0,0 4 0,-14 26 0,1 1 0,0-1 0,1 1 0,0 1 0,7-11 0,31-45 0,-24 38 0,9-10 0,-10 13 0,-15 18 0,0 0 0,0 0 0,0 1 0,0-1 0,1 1 0,6-5 0,17-14 0,-20 16 0,0 1 0,1-1 0,14-7 0,27-24 0,32-7 0,-69 37 0,1 0 0,17-5 0,-5 2 0,-13 5 0,0 2 0,1 0 0,21-3 0,-27 5 0,5-1 0,-1-1 0,1 0 0,-1-1 0,0 0 0,15-8 0,-16 8 0,-1 0 0,1 1 0,0 0 0,-1 1 0,1 0 0,17-1 0,64 4 0,-40 0 0,584-1 0,-589 6 0,-3 0 0,-23-5 0,0 2 0,-1 1 0,30 9 0,-20-5 0,-2-1 0,-11-2 0,2 0 0,-1-2 0,0 0 0,29 1 0,10 1 0,-1 1 0,-20-6 0,53 8 0,-49-5 0,0-1 0,39-3 0,-11-1 0,-45 3 0,1 0 0,24 6 0,-17-2 0,0-1 0,41 1 0,-66-5-227,1 0-1,-1 0 1,1 0-1,-1 1 1,8 2-1</inkml:trace>
-</inkml:ink>
-</file>
-
-<file path=ppt/ink/ink2.xml><?xml version="1.0" encoding="utf-8"?>
-<inkml:ink xmlns:inkml="http://www.w3.org/2003/InkML">
-  <inkml:definitions>
-    <inkml:context xml:id="ctx0">
-      <inkml:inkSource xml:id="inkSrc0">
-        <inkml:traceFormat>
-          <inkml:channel name="X" type="integer" min="-2.14748E9" max="2.14748E9" units="cm"/>
-          <inkml:channel name="Y" type="integer" min="-2.14748E9" max="2.14748E9" units="cm"/>
-          <inkml:channel name="F" type="integer" max="32767" units="dev"/>
-        </inkml:traceFormat>
-        <inkml:channelProperties>
-          <inkml:channelProperty channel="X" name="resolution" value="1000" units="1/cm"/>
-          <inkml:channelProperty channel="Y" name="resolution" value="1000" units="1/cm"/>
-          <inkml:channelProperty channel="F" name="resolution" value="0" units="1/dev"/>
-        </inkml:channelProperties>
-      </inkml:inkSource>
       <inkml:timestamp xml:id="ts0" timeString="2023-07-05T09:12:39.646"/>
     </inkml:context>
     <inkml:brush xml:id="br0">
@@ -171,7 +144,7 @@
 </inkml:ink>
 </file>
 
-<file path=ppt/ink/ink3.xml><?xml version="1.0" encoding="utf-8"?>
+<file path=ppt/ink/ink2.xml><?xml version="1.0" encoding="utf-8"?>
 <inkml:ink xmlns:inkml="http://www.w3.org/2003/InkML">
   <inkml:definitions>
     <inkml:context xml:id="ctx0">
@@ -198,7 +171,7 @@
 </inkml:ink>
 </file>
 
-<file path=ppt/ink/ink4.xml><?xml version="1.0" encoding="utf-8"?>
+<file path=ppt/ink/ink3.xml><?xml version="1.0" encoding="utf-8"?>
 <inkml:ink xmlns:inkml="http://www.w3.org/2003/InkML">
   <inkml:definitions>
     <inkml:context xml:id="ctx0">
@@ -225,7 +198,7 @@
 </inkml:ink>
 </file>
 
-<file path=ppt/ink/ink5.xml><?xml version="1.0" encoding="utf-8"?>
+<file path=ppt/ink/ink4.xml><?xml version="1.0" encoding="utf-8"?>
 <inkml:ink xmlns:inkml="http://www.w3.org/2003/InkML">
   <inkml:definitions>
     <inkml:context xml:id="ctx0">
@@ -252,7 +225,7 @@
 </inkml:ink>
 </file>
 
-<file path=ppt/ink/ink6.xml><?xml version="1.0" encoding="utf-8"?>
+<file path=ppt/ink/ink5.xml><?xml version="1.0" encoding="utf-8"?>
 <inkml:ink xmlns:inkml="http://www.w3.org/2003/InkML">
   <inkml:definitions>
     <inkml:context xml:id="ctx0">
@@ -276,6 +249,87 @@
     </inkml:brush>
   </inkml:definitions>
   <inkml:trace contextRef="#ctx0" brushRef="#br0">1 1 24575,'0'4'0,"1"1"0,-1 0 0,1-1 0,0 1 0,1-1 0,-1 1 0,1-1 0,3 7 0,23 34 0,-6-11 0,26 54 0,-39-70 0,18 27 0,-25-42 0,0 0 0,-1 1 0,0-1 0,0 0 0,0 0 0,0 1 0,0-1 0,-1 1 0,1-1 0,-1 1 0,0-1 0,0 1 0,0-1 0,-1 0 0,1 1 0,-1-1 0,-1 4 0,-3 9 0,0 0 0,-9 18 0,10-25 0,-24 63 0,23-60 0,1-1 0,-2 1 0,1-1 0,-9 10 0,6-6 0,-11 26 0,-5 10 0,11-25-1365</inkml:trace>
+</inkml:ink>
+</file>
+
+<file path=ppt/ink/ink6.xml><?xml version="1.0" encoding="utf-8"?>
+<inkml:ink xmlns:inkml="http://www.w3.org/2003/InkML">
+  <inkml:definitions>
+    <inkml:context xml:id="ctx0">
+      <inkml:inkSource xml:id="inkSrc0">
+        <inkml:traceFormat>
+          <inkml:channel name="X" type="integer" min="-2.14748E9" max="2.14748E9" units="cm"/>
+          <inkml:channel name="Y" type="integer" min="-2.14748E9" max="2.14748E9" units="cm"/>
+          <inkml:channel name="F" type="integer" max="32767" units="dev"/>
+        </inkml:traceFormat>
+        <inkml:channelProperties>
+          <inkml:channelProperty channel="X" name="resolution" value="1000" units="1/cm"/>
+          <inkml:channelProperty channel="Y" name="resolution" value="1000" units="1/cm"/>
+          <inkml:channelProperty channel="F" name="resolution" value="0" units="1/dev"/>
+        </inkml:channelProperties>
+      </inkml:inkSource>
+      <inkml:timestamp xml:id="ts0" timeString="2023-07-05T09:30:09.079"/>
+    </inkml:context>
+    <inkml:brush xml:id="br0">
+      <inkml:brushProperty name="width" value="0.05" units="cm"/>
+      <inkml:brushProperty name="height" value="0.05" units="cm"/>
+    </inkml:brush>
+  </inkml:definitions>
+  <inkml:trace contextRef="#ctx0" brushRef="#br0">0 10784 24575,'313'0'0,"-305"1"0,-1 0 0,1 0 0,10 3 0,-14-2 0,1-1 0,0 0 0,-1 0 0,1 0 0,0 0 0,0-1 0,-1 0 0,1 0 0,0 0 0,0-1 0,-1 0 0,8-1 0,-11 1 0,0 1 0,0-1 0,0 0 0,0 0 0,0 0 0,-1 1 0,1-1 0,0 0 0,0 0 0,0 0 0,-1-1 0,1 1 0,-1 0 0,1 0 0,-1 0 0,1 0 0,-1 0 0,0-1 0,1 1 0,-1 0 0,0 0 0,0-1 0,0 1 0,0 0 0,0 0 0,-1-3 0,-6-38 0,3 28 0,0-10 0,1 0 0,-1-40 0,4-170 0,-1 224 0,0 0 0,-3-15 0,-2-19 0,6 4 0,1 21 0,-1 1 0,-1-1 0,-6-35 0,-6-33 0,11 42 0,0-2 0,2 43 0,-1 0 0,0 1 0,0-1 0,0 1 0,-1-1 0,1 1 0,-1 0 0,1 0 0,-1-1 0,-4-3 0,5 6 0,0 0 0,0 0 0,0 0 0,0 0 0,1 0 0,-1-1 0,0 1 0,0 0 0,1 0 0,-1-1 0,1 1 0,-1 0 0,1-1 0,-1 1 0,1-1 0,0 1 0,0-1 0,0 1 0,-1-1 0,2 1 0,-1 0 0,0-1 0,0 1 0,0-1 0,1 1 0,-1-1 0,1-1 0,1 2 0,-1-1 0,0 1 0,1 0 0,-1-1 0,1 1 0,-1 0 0,1 0 0,0 0 0,-1 1 0,1-1 0,0 0 0,0 0 0,0 1 0,-1-1 0,1 1 0,0 0 0,0 0 0,0-1 0,0 1 0,2 1 0,16-1 0,0 2 0,33 6 0,-52-7 0,88 10 0,-58-8 0,0-1 0,46-3 0,-17-1 0,-43 1 0,1-1 0,0 0 0,30-10 0,-30 7 0,0 1 0,1 1 0,25-2 0,17-1 0,-22 1 0,58-11 0,-68 10 0,0 1 0,50-1 0,-58 5 0,25-4 0,-25 2 0,25 1 0,-22 2 0,0-2 0,31-4 0,-16-2 0,76-9 0,-16 8 0,24-14 0,-34 12 0,-46 8 0,78 2 0,-51 3 0,1445-2 0,-1460 6 0,-40-4 0,27 1 0,259-3 0,-300 0 0,0 0 0,0 0 0,1 0 0,-1 0 0,0 0 0,0 0 0,1 0 0,-1-1 0,0 1 0,0 0 0,1-1 0,-1 1 0,0-1 0,0 1 0,0-1 0,0 0 0,0 1 0,0-1 0,0 0 0,0 0 0,0 0 0,0 0 0,0 0 0,0 0 0,-1 0 0,1 0 0,0-1 0,0-2 0,0 0 0,0 0 0,0 0 0,-1 0 0,1 0 0,-1 0 0,-1-6 0,0-31 0,1-132 0,5 131 0,-3 22 0,2-30 0,-4 7 0,3 1 0,11-63 0,-7 66 0,-3 1 0,1-57 0,-5 86 0,1 0 0,1 0 0,-1 0 0,6-15 0,-4 14 0,0 0 0,-1 0 0,2-15 0,-3-211 0,-3 114 0,2-691 0,1 805 0,0 1 0,0 0 0,0 0 0,1 0 0,3-9 0,-2 8 0,0 0 0,-1 0 0,-1 0 0,2-9 0,-2-9 0,-1 9 0,5-29 0,29-125 0,-23 86 0,2-18 0,21-98 0,-26 104 0,-5 74 0,-1 1 0,-1-1 0,-2-24 0,1-38 0,5 43 0,-2 22 0,0-30 0,-3-262 0,-1 298 0,-5-28 0,1 9 0,2 5 0,-1-2 0,0-34 0,5 43 0,-1-5 0,0-1 0,-7-44 0,4 51 0,1 1 0,1-26 0,1 25 0,0 0 0,-5-24 0,2 22 0,1-1 0,1-27 0,1 25 0,-5-39 0,2 41 0,1-27 0,1 29 0,-4-35 0,2 34 0,1-1 0,1 1 0,3-25 0,-3-39 0,-5 49 0,4 24 0,-2-26 0,-1-15 0,-1-4 0,1-7 0,2 43 0,0-24 0,3 25 0,-2 0 0,-4-29 0,-3-47 0,0 21 0,5 33 0,-7-73 0,-1 27 0,-9-51 0,9 12 0,5 85 0,-1-9 0,-2-86 0,10-564 0,6 647 0,-4 40 0,2-26 0,-5-1396 0,7 1382 0,-4 39 0,2-25 0,-4 19 0,2 1 0,4-27 0,-4 27 0,0-1 0,-2-26 0,-1 28 0,2-1 0,4-34 0,1 25 0,-1 0 0,1-55 0,-1 7 0,1 0 0,-5 54 0,1-1 0,6-26 0,-4 27 0,-1 0 0,1-28 0,-4 31 0,1-1 0,6-27 0,2-10 0,14-63 0,-21 112 0,-1-1 0,0 0 0,0-12 0,-1 12 0,1 0 0,0 0 0,3-12 0,4-36 0,-3 20 0,6-11 0,-7 33 0,0 0 0,-2 1 0,2-26 0,-4 40 0,0 1 0,0 0 0,0 0 0,0-1 0,0 1 0,0 0 0,0-1 0,1 1 0,-1 0 0,0 0 0,1-1 0,-1 1 0,1 0 0,0 0 0,-1 0 0,1 0 0,0-1 0,-1 1 0,1 0 0,0 0 0,0 0 0,0 1 0,0-1 0,0 0 0,0 0 0,2 0 0,0 0 0,1 0 0,0 0 0,0 0 0,-1 1 0,1-1 0,0 1 0,0 0 0,4 1 0,18-2 0,30-3 0,20-1 0,358 5 0,-379 6 0,-39-3 0,25 0 0,-31-3 0,0 0 0,0 0 0,0 1 0,0 1 0,0 0 0,0 0 0,16 6 0,-19-6 0,0 0 0,1 0 0,-1-1 0,1 0 0,11 1 0,22 2 0,9 2 0,-38-6 0,0 1 0,15 3 0,-11-1 0,0-1 0,0-1 0,1-1 0,19-1 0,-13 0 0,26 2 0,-13 4 0,-23-3 0,0 0 0,14 0 0,1076-2-1365,-1093 0-5461</inkml:trace>
+</inkml:ink>
+</file>
+
+<file path=ppt/ink/ink7.xml><?xml version="1.0" encoding="utf-8"?>
+<inkml:ink xmlns:inkml="http://www.w3.org/2003/InkML">
+  <inkml:definitions>
+    <inkml:context xml:id="ctx0">
+      <inkml:inkSource xml:id="inkSrc0">
+        <inkml:traceFormat>
+          <inkml:channel name="X" type="integer" min="-2.14748E9" max="2.14748E9" units="cm"/>
+          <inkml:channel name="Y" type="integer" min="-2.14748E9" max="2.14748E9" units="cm"/>
+          <inkml:channel name="F" type="integer" max="32767" units="dev"/>
+        </inkml:traceFormat>
+        <inkml:channelProperties>
+          <inkml:channelProperty channel="X" name="resolution" value="1000" units="1/cm"/>
+          <inkml:channelProperty channel="Y" name="resolution" value="1000" units="1/cm"/>
+          <inkml:channelProperty channel="F" name="resolution" value="0" units="1/dev"/>
+        </inkml:channelProperties>
+      </inkml:inkSource>
+      <inkml:timestamp xml:id="ts0" timeString="2023-07-05T09:30:13.067"/>
+    </inkml:context>
+    <inkml:brush xml:id="br0">
+      <inkml:brushProperty name="width" value="0.05" units="cm"/>
+      <inkml:brushProperty name="height" value="0.05" units="cm"/>
+    </inkml:brush>
+  </inkml:definitions>
+  <inkml:trace contextRef="#ctx0" brushRef="#br0">1 1 24575,'6'0'0,"0"1"0,1 0 0,-1 0 0,0 0 0,0 1 0,1 0 0,-1 0 0,6 4 0,45 27 0,-35-17 0,-10-8 0,0 0 0,16 8 0,-27-16 0,0 0 0,0 1 0,0-1 0,0 0 0,-1 1 0,1-1 0,0 1 0,0-1 0,0 1 0,-1 0 0,1-1 0,0 1 0,-1 0 0,1 0 0,0-1 0,-1 1 0,1 0 0,-1 0 0,0 0 0,1 1 0,-1-1 0,0-1 0,0 1 0,0 0 0,0-1 0,0 1 0,-1 0 0,1-1 0,0 1 0,0 0 0,-1-1 0,1 1 0,0 0 0,-1-1 0,1 1 0,-1-1 0,1 1 0,-1-1 0,1 1 0,-1-1 0,0 1 0,-5 3 0,0 0 0,0-1 0,0 0 0,-8 3 0,10-4 0,-87 42 0,83-40 19,0 1-1,-12 10 1,3-4-1440</inkml:trace>
+</inkml:ink>
+</file>
+
+<file path=ppt/ink/ink8.xml><?xml version="1.0" encoding="utf-8"?>
+<inkml:ink xmlns:inkml="http://www.w3.org/2003/InkML">
+  <inkml:definitions>
+    <inkml:context xml:id="ctx0">
+      <inkml:inkSource xml:id="inkSrc0">
+        <inkml:traceFormat>
+          <inkml:channel name="X" type="integer" min="-2.14748E9" max="2.14748E9" units="cm"/>
+          <inkml:channel name="Y" type="integer" min="-2.14748E9" max="2.14748E9" units="cm"/>
+          <inkml:channel name="F" type="integer" max="32767" units="dev"/>
+        </inkml:traceFormat>
+        <inkml:channelProperties>
+          <inkml:channelProperty channel="X" name="resolution" value="1000" units="1/cm"/>
+          <inkml:channelProperty channel="Y" name="resolution" value="1000" units="1/cm"/>
+          <inkml:channelProperty channel="F" name="resolution" value="0" units="1/dev"/>
+        </inkml:channelProperties>
+      </inkml:inkSource>
+      <inkml:timestamp xml:id="ts0" timeString="2023-07-05T09:30:14.761"/>
+    </inkml:context>
+    <inkml:brush xml:id="br0">
+      <inkml:brushProperty name="width" value="0.05" units="cm"/>
+      <inkml:brushProperty name="height" value="0.05" units="cm"/>
+    </inkml:brush>
+  </inkml:definitions>
+  <inkml:trace contextRef="#ctx0" brushRef="#br0">1 403 24575,'0'-3'0,"1"-1"0,-1 1 0,1-1 0,-1 1 0,1 0 0,0-1 0,1 1 0,-1 0 0,1 0 0,2-5 0,24-29 0,-22 30 0,0-1 0,0 1 0,-1-1 0,6-11 0,13-32 0,-14 32 0,-1-1 0,-1 0 0,6-22 0,15-56 0,-28 96 0,-1 1 0,1 0 0,-1-1 0,1 1 0,0 0 0,-1-1 0,1 1 0,0 0 0,0 0 0,0 0 0,0 0 0,0 0 0,0 0 0,0 0 0,0 0 0,0 0 0,0 0 0,1 0 0,-1 1 0,0-1 0,1 1 0,-1-1 0,0 1 0,1-1 0,-1 1 0,1 0 0,-1-1 0,0 1 0,1 0 0,-1 0 0,1 0 0,-1 0 0,1 0 0,1 1 0,6 1 0,0 1 0,-1 0 0,1 0 0,13 8 0,3 0 0,-15-6 0,-1-1 0,0 2 0,0-1 0,0 1 0,0 1 0,9 9 0,-2 4 0,-14-18 0,-1 1 0,1-1 0,0 1 0,0-1 0,1 1 0,-1-1 0,0 0 0,1 0 0,-1 0 0,4 1 0,6 3-107,-8-5 2,-1 1 0,1 0 0,-1-1 1,1 1-1,-1 0 0,0 1 0,0-1 0,0 1 0,0-1 1,0 1-1,2 4 0</inkml:trace>
 </inkml:ink>
 </file>
 
@@ -5579,6 +5633,41 @@
           </a:p>
         </p:txBody>
       </p:sp>
+      <p:sp>
+        <p:nvSpPr>
+          <p:cNvPr id="3" name="TextBox 2">
+            <a:extLst>
+              <a:ext uri="{FF2B5EF4-FFF2-40B4-BE49-F238E27FC236}">
+                <a16:creationId xmlns:a16="http://schemas.microsoft.com/office/drawing/2014/main" id="{53E9744E-0D75-C6D3-21F6-F77DE6FEF8DA}"/>
+              </a:ext>
+            </a:extLst>
+          </p:cNvPr>
+          <p:cNvSpPr txBox="1"/>
+          <p:nvPr/>
+        </p:nvSpPr>
+        <p:spPr>
+          <a:xfrm>
+            <a:off x="1898688" y="2851366"/>
+            <a:ext cx="756475" cy="707886"/>
+          </a:xfrm>
+          <a:prstGeom prst="rect">
+            <a:avLst/>
+          </a:prstGeom>
+          <a:noFill/>
+        </p:spPr>
+        <p:txBody>
+          <a:bodyPr wrap="square" rtlCol="0">
+            <a:spAutoFit/>
+          </a:bodyPr>
+          <a:lstStyle/>
+          <a:p>
+            <a:r>
+              <a:rPr lang="ko-KR" altLang="en-US" sz="4000" b="1" dirty="0"/>
+              <a:t>텅</a:t>
+            </a:r>
+          </a:p>
+        </p:txBody>
+      </p:sp>
     </p:spTree>
     <p:extLst>
       <p:ext uri="{BB962C8B-B14F-4D97-AF65-F5344CB8AC3E}">
@@ -7392,60 +7481,9 @@
           </a:p>
         </p:txBody>
       </p:sp>
-      <mc:AlternateContent xmlns:mc="http://schemas.openxmlformats.org/markup-compatibility/2006">
-        <mc:Choice xmlns:p14="http://schemas.microsoft.com/office/powerpoint/2010/main" Requires="p14">
+      <mc:AlternateContent xmlns:mc="http://schemas.openxmlformats.org/markup-compatibility/2006" xmlns:p14="http://schemas.microsoft.com/office/powerpoint/2010/main">
+        <mc:Choice Requires="p14">
           <p:contentPart p14:bwMode="auto" r:id="rId4">
-            <p14:nvContentPartPr>
-              <p14:cNvPr id="81" name="잉크 80">
-                <a:extLst>
-                  <a:ext uri="{FF2B5EF4-FFF2-40B4-BE49-F238E27FC236}">
-                    <a16:creationId xmlns:a16="http://schemas.microsoft.com/office/drawing/2014/main" id="{51F52B58-B7A1-9930-9F66-040809E6B476}"/>
-                  </a:ext>
-                </a:extLst>
-              </p14:cNvPr>
-              <p14:cNvContentPartPr/>
-              <p14:nvPr/>
-            </p14:nvContentPartPr>
-            <p14:xfrm>
-              <a:off x="921891" y="444208"/>
-              <a:ext cx="2706120" cy="3774960"/>
-            </p14:xfrm>
-          </p:contentPart>
-        </mc:Choice>
-        <mc:Fallback>
-          <p:pic>
-            <p:nvPicPr>
-              <p:cNvPr id="81" name="잉크 80">
-                <a:extLst>
-                  <a:ext uri="{FF2B5EF4-FFF2-40B4-BE49-F238E27FC236}">
-                    <a16:creationId xmlns:a16="http://schemas.microsoft.com/office/drawing/2014/main" id="{51F52B58-B7A1-9930-9F66-040809E6B476}"/>
-                  </a:ext>
-                </a:extLst>
-              </p:cNvPr>
-              <p:cNvPicPr/>
-              <p:nvPr/>
-            </p:nvPicPr>
-            <p:blipFill>
-              <a:blip r:embed="rId5"/>
-              <a:stretch>
-                <a:fillRect/>
-              </a:stretch>
-            </p:blipFill>
-            <p:spPr>
-              <a:xfrm>
-                <a:off x="913251" y="435208"/>
-                <a:ext cx="2723760" cy="3792600"/>
-              </a:xfrm>
-              <a:prstGeom prst="rect">
-                <a:avLst/>
-              </a:prstGeom>
-            </p:spPr>
-          </p:pic>
-        </mc:Fallback>
-      </mc:AlternateContent>
-      <mc:AlternateContent xmlns:mc="http://schemas.openxmlformats.org/markup-compatibility/2006">
-        <mc:Choice xmlns:p14="http://schemas.microsoft.com/office/powerpoint/2010/main" Requires="p14">
-          <p:contentPart p14:bwMode="auto" r:id="rId6">
             <p14:nvContentPartPr>
               <p14:cNvPr id="84" name="잉크 83">
                 <a:extLst>
@@ -7463,7 +7501,7 @@
             </p14:xfrm>
           </p:contentPart>
         </mc:Choice>
-        <mc:Fallback>
+        <mc:Fallback xmlns="">
           <p:pic>
             <p:nvPicPr>
               <p:cNvPr id="84" name="잉크 83">
@@ -7494,8 +7532,8 @@
           </p:pic>
         </mc:Fallback>
       </mc:AlternateContent>
-      <mc:AlternateContent xmlns:mc="http://schemas.openxmlformats.org/markup-compatibility/2006">
-        <mc:Choice xmlns:p14="http://schemas.microsoft.com/office/powerpoint/2010/main" Requires="p14">
+      <mc:AlternateContent xmlns:mc="http://schemas.openxmlformats.org/markup-compatibility/2006" xmlns:p14="http://schemas.microsoft.com/office/powerpoint/2010/main">
+        <mc:Choice Requires="p14">
           <p:contentPart p14:bwMode="auto" r:id="rId8">
             <p14:nvContentPartPr>
               <p14:cNvPr id="85" name="잉크 84">
@@ -7514,7 +7552,7 @@
             </p14:xfrm>
           </p:contentPart>
         </mc:Choice>
-        <mc:Fallback>
+        <mc:Fallback xmlns="">
           <p:pic>
             <p:nvPicPr>
               <p:cNvPr id="85" name="잉크 84">
@@ -7545,8 +7583,8 @@
           </p:pic>
         </mc:Fallback>
       </mc:AlternateContent>
-      <mc:AlternateContent xmlns:mc="http://schemas.openxmlformats.org/markup-compatibility/2006">
-        <mc:Choice xmlns:p14="http://schemas.microsoft.com/office/powerpoint/2010/main" Requires="p14">
+      <mc:AlternateContent xmlns:mc="http://schemas.openxmlformats.org/markup-compatibility/2006" xmlns:p14="http://schemas.microsoft.com/office/powerpoint/2010/main">
+        <mc:Choice Requires="p14">
           <p:contentPart p14:bwMode="auto" r:id="rId10">
             <p14:nvContentPartPr>
               <p14:cNvPr id="86" name="잉크 85">
@@ -7565,7 +7603,7 @@
             </p14:xfrm>
           </p:contentPart>
         </mc:Choice>
-        <mc:Fallback>
+        <mc:Fallback xmlns="">
           <p:pic>
             <p:nvPicPr>
               <p:cNvPr id="86" name="잉크 85">
@@ -7616,8 +7654,8 @@
             <a:chExt cx="2363040" cy="4616640"/>
           </a:xfrm>
         </p:grpSpPr>
-        <mc:AlternateContent xmlns:mc="http://schemas.openxmlformats.org/markup-compatibility/2006">
-          <mc:Choice xmlns:p14="http://schemas.microsoft.com/office/powerpoint/2010/main" Requires="p14">
+        <mc:AlternateContent xmlns:mc="http://schemas.openxmlformats.org/markup-compatibility/2006" xmlns:p14="http://schemas.microsoft.com/office/powerpoint/2010/main">
+          <mc:Choice Requires="p14">
             <p:contentPart p14:bwMode="auto" r:id="rId12">
               <p14:nvContentPartPr>
                 <p14:cNvPr id="89" name="잉크 88">
@@ -7636,7 +7674,7 @@
               </p14:xfrm>
             </p:contentPart>
           </mc:Choice>
-          <mc:Fallback>
+          <mc:Fallback xmlns="">
             <p:pic>
               <p:nvPicPr>
                 <p:cNvPr id="89" name="잉크 88">
@@ -7667,8 +7705,8 @@
             </p:pic>
           </mc:Fallback>
         </mc:AlternateContent>
-        <mc:AlternateContent xmlns:mc="http://schemas.openxmlformats.org/markup-compatibility/2006">
-          <mc:Choice xmlns:p14="http://schemas.microsoft.com/office/powerpoint/2010/main" Requires="p14">
+        <mc:AlternateContent xmlns:mc="http://schemas.openxmlformats.org/markup-compatibility/2006" xmlns:p14="http://schemas.microsoft.com/office/powerpoint/2010/main">
+          <mc:Choice Requires="p14">
             <p:contentPart p14:bwMode="auto" r:id="rId14">
               <p14:nvContentPartPr>
                 <p14:cNvPr id="91" name="잉크 90">
@@ -7687,7 +7725,7 @@
               </p14:xfrm>
             </p:contentPart>
           </mc:Choice>
-          <mc:Fallback>
+          <mc:Fallback xmlns="">
             <p:pic>
               <p:nvPicPr>
                 <p:cNvPr id="91" name="잉크 90">
@@ -7719,6 +7757,194 @@
           </mc:Fallback>
         </mc:AlternateContent>
       </p:grpSp>
+      <p:sp>
+        <p:nvSpPr>
+          <p:cNvPr id="4" name="TextBox 3">
+            <a:extLst>
+              <a:ext uri="{FF2B5EF4-FFF2-40B4-BE49-F238E27FC236}">
+                <a16:creationId xmlns:a16="http://schemas.microsoft.com/office/drawing/2014/main" id="{FD43B5EF-BE2C-F5A1-E334-6ED5E85EB164}"/>
+              </a:ext>
+            </a:extLst>
+          </p:cNvPr>
+          <p:cNvSpPr txBox="1"/>
+          <p:nvPr/>
+        </p:nvSpPr>
+        <p:spPr>
+          <a:xfrm>
+            <a:off x="942235" y="3216316"/>
+            <a:ext cx="756475" cy="707886"/>
+          </a:xfrm>
+          <a:prstGeom prst="rect">
+            <a:avLst/>
+          </a:prstGeom>
+          <a:noFill/>
+        </p:spPr>
+        <p:txBody>
+          <a:bodyPr wrap="square" rtlCol="0">
+            <a:spAutoFit/>
+          </a:bodyPr>
+          <a:lstStyle/>
+          <a:p>
+            <a:r>
+              <a:rPr lang="ko-KR" altLang="en-US" sz="4000" b="1" dirty="0"/>
+              <a:t>텅</a:t>
+            </a:r>
+          </a:p>
+        </p:txBody>
+      </p:sp>
+      <mc:AlternateContent xmlns:mc="http://schemas.openxmlformats.org/markup-compatibility/2006">
+        <mc:Choice xmlns:p14="http://schemas.microsoft.com/office/powerpoint/2010/main" Requires="p14">
+          <p:contentPart p14:bwMode="auto" r:id="rId16">
+            <p14:nvContentPartPr>
+              <p14:cNvPr id="5" name="잉크 4">
+                <a:extLst>
+                  <a:ext uri="{FF2B5EF4-FFF2-40B4-BE49-F238E27FC236}">
+                    <a16:creationId xmlns:a16="http://schemas.microsoft.com/office/drawing/2014/main" id="{D19F7638-8959-B4B6-0EC3-0950164F6012}"/>
+                  </a:ext>
+                </a:extLst>
+              </p14:cNvPr>
+              <p14:cNvContentPartPr/>
+              <p14:nvPr/>
+            </p14:nvContentPartPr>
+            <p14:xfrm>
+              <a:off x="1182891" y="480928"/>
+              <a:ext cx="2450520" cy="3887640"/>
+            </p14:xfrm>
+          </p:contentPart>
+        </mc:Choice>
+        <mc:Fallback>
+          <p:pic>
+            <p:nvPicPr>
+              <p:cNvPr id="5" name="잉크 4">
+                <a:extLst>
+                  <a:ext uri="{FF2B5EF4-FFF2-40B4-BE49-F238E27FC236}">
+                    <a16:creationId xmlns:a16="http://schemas.microsoft.com/office/drawing/2014/main" id="{D19F7638-8959-B4B6-0EC3-0950164F6012}"/>
+                  </a:ext>
+                </a:extLst>
+              </p:cNvPr>
+              <p:cNvPicPr/>
+              <p:nvPr/>
+            </p:nvPicPr>
+            <p:blipFill>
+              <a:blip r:embed="rId17"/>
+              <a:stretch>
+                <a:fillRect/>
+              </a:stretch>
+            </p:blipFill>
+            <p:spPr>
+              <a:xfrm>
+                <a:off x="1173891" y="471928"/>
+                <a:ext cx="2468160" cy="3905280"/>
+              </a:xfrm>
+              <a:prstGeom prst="rect">
+                <a:avLst/>
+              </a:prstGeom>
+            </p:spPr>
+          </p:pic>
+        </mc:Fallback>
+      </mc:AlternateContent>
+      <mc:AlternateContent xmlns:mc="http://schemas.openxmlformats.org/markup-compatibility/2006">
+        <mc:Choice xmlns:p14="http://schemas.microsoft.com/office/powerpoint/2010/main" Requires="p14">
+          <p:contentPart p14:bwMode="auto" r:id="rId18">
+            <p14:nvContentPartPr>
+              <p14:cNvPr id="6" name="잉크 5">
+                <a:extLst>
+                  <a:ext uri="{FF2B5EF4-FFF2-40B4-BE49-F238E27FC236}">
+                    <a16:creationId xmlns:a16="http://schemas.microsoft.com/office/drawing/2014/main" id="{94B57345-CF41-2FE9-C241-E076E7B59373}"/>
+                  </a:ext>
+                </a:extLst>
+              </p14:cNvPr>
+              <p14:cNvContentPartPr/>
+              <p14:nvPr/>
+            </p14:nvContentPartPr>
+            <p14:xfrm>
+              <a:off x="1254891" y="4322848"/>
+              <a:ext cx="75600" cy="81720"/>
+            </p14:xfrm>
+          </p:contentPart>
+        </mc:Choice>
+        <mc:Fallback>
+          <p:pic>
+            <p:nvPicPr>
+              <p:cNvPr id="6" name="잉크 5">
+                <a:extLst>
+                  <a:ext uri="{FF2B5EF4-FFF2-40B4-BE49-F238E27FC236}">
+                    <a16:creationId xmlns:a16="http://schemas.microsoft.com/office/drawing/2014/main" id="{94B57345-CF41-2FE9-C241-E076E7B59373}"/>
+                  </a:ext>
+                </a:extLst>
+              </p:cNvPr>
+              <p:cNvPicPr/>
+              <p:nvPr/>
+            </p:nvPicPr>
+            <p:blipFill>
+              <a:blip r:embed="rId19"/>
+              <a:stretch>
+                <a:fillRect/>
+              </a:stretch>
+            </p:blipFill>
+            <p:spPr>
+              <a:xfrm>
+                <a:off x="1246251" y="4314208"/>
+                <a:ext cx="93240" cy="99360"/>
+              </a:xfrm>
+              <a:prstGeom prst="rect">
+                <a:avLst/>
+              </a:prstGeom>
+            </p:spPr>
+          </p:pic>
+        </mc:Fallback>
+      </mc:AlternateContent>
+      <mc:AlternateContent xmlns:mc="http://schemas.openxmlformats.org/markup-compatibility/2006">
+        <mc:Choice xmlns:p14="http://schemas.microsoft.com/office/powerpoint/2010/main" Requires="p14">
+          <p:contentPart p14:bwMode="auto" r:id="rId20">
+            <p14:nvContentPartPr>
+              <p14:cNvPr id="7" name="잉크 6">
+                <a:extLst>
+                  <a:ext uri="{FF2B5EF4-FFF2-40B4-BE49-F238E27FC236}">
+                    <a16:creationId xmlns:a16="http://schemas.microsoft.com/office/drawing/2014/main" id="{80E7E06B-E564-6579-A261-9F58ADB7860B}"/>
+                  </a:ext>
+                </a:extLst>
+              </p14:cNvPr>
+              <p14:cNvContentPartPr/>
+              <p14:nvPr/>
+            </p14:nvContentPartPr>
+            <p14:xfrm>
+              <a:off x="2658531" y="3492328"/>
+              <a:ext cx="166320" cy="145440"/>
+            </p14:xfrm>
+          </p:contentPart>
+        </mc:Choice>
+        <mc:Fallback>
+          <p:pic>
+            <p:nvPicPr>
+              <p:cNvPr id="7" name="잉크 6">
+                <a:extLst>
+                  <a:ext uri="{FF2B5EF4-FFF2-40B4-BE49-F238E27FC236}">
+                    <a16:creationId xmlns:a16="http://schemas.microsoft.com/office/drawing/2014/main" id="{80E7E06B-E564-6579-A261-9F58ADB7860B}"/>
+                  </a:ext>
+                </a:extLst>
+              </p:cNvPr>
+              <p:cNvPicPr/>
+              <p:nvPr/>
+            </p:nvPicPr>
+            <p:blipFill>
+              <a:blip r:embed="rId21"/>
+              <a:stretch>
+                <a:fillRect/>
+              </a:stretch>
+            </p:blipFill>
+            <p:spPr>
+              <a:xfrm>
+                <a:off x="2649891" y="3483328"/>
+                <a:ext cx="183960" cy="163080"/>
+              </a:xfrm>
+              <a:prstGeom prst="rect">
+                <a:avLst/>
+              </a:prstGeom>
+            </p:spPr>
+          </p:pic>
+        </mc:Fallback>
+      </mc:AlternateContent>
     </p:spTree>
     <p:extLst>
       <p:ext uri="{BB962C8B-B14F-4D97-AF65-F5344CB8AC3E}">

</xml_diff>